<commit_message>
riboseq_patrick image was updated and the script was added
</commit_message>
<xml_diff>
--- a/images/riboseq_patrick.pptx
+++ b/images/riboseq_patrick.pptx
@@ -208,7 +208,7 @@
           <a:p>
             <a:fld id="{C571D33F-B151-5442-9D79-DA0A881D815F}" type="datetimeFigureOut">
               <a:rPr lang="en-US" smtClean="0"/>
-              <a:t>6/12/23</a:t>
+              <a:t>6/15/23</a:t>
             </a:fld>
             <a:endParaRPr lang="en-US"/>
           </a:p>
@@ -743,7 +743,7 @@
           <a:p>
             <a:fld id="{01197F44-DB72-474A-9754-31703E05C006}" type="datetimeFigureOut">
               <a:rPr lang="en-US" smtClean="0"/>
-              <a:t>6/12/23</a:t>
+              <a:t>6/15/23</a:t>
             </a:fld>
             <a:endParaRPr lang="en-US"/>
           </a:p>
@@ -911,7 +911,7 @@
           <a:p>
             <a:fld id="{01197F44-DB72-474A-9754-31703E05C006}" type="datetimeFigureOut">
               <a:rPr lang="en-US" smtClean="0"/>
-              <a:t>6/12/23</a:t>
+              <a:t>6/15/23</a:t>
             </a:fld>
             <a:endParaRPr lang="en-US"/>
           </a:p>
@@ -1089,7 +1089,7 @@
           <a:p>
             <a:fld id="{01197F44-DB72-474A-9754-31703E05C006}" type="datetimeFigureOut">
               <a:rPr lang="en-US" smtClean="0"/>
-              <a:t>6/12/23</a:t>
+              <a:t>6/15/23</a:t>
             </a:fld>
             <a:endParaRPr lang="en-US"/>
           </a:p>
@@ -1257,7 +1257,7 @@
           <a:p>
             <a:fld id="{01197F44-DB72-474A-9754-31703E05C006}" type="datetimeFigureOut">
               <a:rPr lang="en-US" smtClean="0"/>
-              <a:t>6/12/23</a:t>
+              <a:t>6/15/23</a:t>
             </a:fld>
             <a:endParaRPr lang="en-US"/>
           </a:p>
@@ -1502,7 +1502,7 @@
           <a:p>
             <a:fld id="{01197F44-DB72-474A-9754-31703E05C006}" type="datetimeFigureOut">
               <a:rPr lang="en-US" smtClean="0"/>
-              <a:t>6/12/23</a:t>
+              <a:t>6/15/23</a:t>
             </a:fld>
             <a:endParaRPr lang="en-US"/>
           </a:p>
@@ -1787,7 +1787,7 @@
           <a:p>
             <a:fld id="{01197F44-DB72-474A-9754-31703E05C006}" type="datetimeFigureOut">
               <a:rPr lang="en-US" smtClean="0"/>
-              <a:t>6/12/23</a:t>
+              <a:t>6/15/23</a:t>
             </a:fld>
             <a:endParaRPr lang="en-US"/>
           </a:p>
@@ -2206,7 +2206,7 @@
           <a:p>
             <a:fld id="{01197F44-DB72-474A-9754-31703E05C006}" type="datetimeFigureOut">
               <a:rPr lang="en-US" smtClean="0"/>
-              <a:t>6/12/23</a:t>
+              <a:t>6/15/23</a:t>
             </a:fld>
             <a:endParaRPr lang="en-US"/>
           </a:p>
@@ -2323,7 +2323,7 @@
           <a:p>
             <a:fld id="{01197F44-DB72-474A-9754-31703E05C006}" type="datetimeFigureOut">
               <a:rPr lang="en-US" smtClean="0"/>
-              <a:t>6/12/23</a:t>
+              <a:t>6/15/23</a:t>
             </a:fld>
             <a:endParaRPr lang="en-US"/>
           </a:p>
@@ -2418,7 +2418,7 @@
           <a:p>
             <a:fld id="{01197F44-DB72-474A-9754-31703E05C006}" type="datetimeFigureOut">
               <a:rPr lang="en-US" smtClean="0"/>
-              <a:t>6/12/23</a:t>
+              <a:t>6/15/23</a:t>
             </a:fld>
             <a:endParaRPr lang="en-US"/>
           </a:p>
@@ -2693,7 +2693,7 @@
           <a:p>
             <a:fld id="{01197F44-DB72-474A-9754-31703E05C006}" type="datetimeFigureOut">
               <a:rPr lang="en-US" smtClean="0"/>
-              <a:t>6/12/23</a:t>
+              <a:t>6/15/23</a:t>
             </a:fld>
             <a:endParaRPr lang="en-US"/>
           </a:p>
@@ -2945,7 +2945,7 @@
           <a:p>
             <a:fld id="{01197F44-DB72-474A-9754-31703E05C006}" type="datetimeFigureOut">
               <a:rPr lang="en-US" smtClean="0"/>
-              <a:t>6/12/23</a:t>
+              <a:t>6/15/23</a:t>
             </a:fld>
             <a:endParaRPr lang="en-US"/>
           </a:p>
@@ -3156,7 +3156,7 @@
           <a:p>
             <a:fld id="{01197F44-DB72-474A-9754-31703E05C006}" type="datetimeFigureOut">
               <a:rPr lang="en-US" smtClean="0"/>
-              <a:t>6/12/23</a:t>
+              <a:t>6/15/23</a:t>
             </a:fld>
             <a:endParaRPr lang="en-US"/>
           </a:p>
@@ -3533,10 +3533,10 @@
       </p:grpSpPr>
       <p:pic>
         <p:nvPicPr>
-          <p:cNvPr id="18" name="Picture 17">
+          <p:cNvPr id="3" name="Picture 2">
             <a:extLst>
               <a:ext uri="{FF2B5EF4-FFF2-40B4-BE49-F238E27FC236}">
-                <a16:creationId xmlns:a16="http://schemas.microsoft.com/office/drawing/2014/main" id="{C276D549-4380-F848-BF6B-C2878BAB57EE}"/>
+                <a16:creationId xmlns:a16="http://schemas.microsoft.com/office/drawing/2014/main" id="{A1BF84F2-CA1F-1B4F-BF02-233640C42FED}"/>
               </a:ext>
             </a:extLst>
           </p:cNvPr>
@@ -3547,25 +3547,60 @@
         </p:nvPicPr>
         <p:blipFill rotWithShape="1">
           <a:blip r:embed="rId3"/>
-          <a:srcRect r="547" b="16599"/>
+          <a:srcRect b="16311"/>
           <a:stretch/>
         </p:blipFill>
         <p:spPr>
           <a:xfrm>
-            <a:off x="3677600" y="0"/>
-            <a:ext cx="3637600" cy="3050498"/>
+            <a:off x="0" y="-1"/>
+            <a:ext cx="3714161" cy="3108326"/>
           </a:xfrm>
           <a:prstGeom prst="rect">
             <a:avLst/>
           </a:prstGeom>
         </p:spPr>
       </p:pic>
+      <p:sp>
+        <p:nvSpPr>
+          <p:cNvPr id="20" name="TextBox 19">
+            <a:extLst>
+              <a:ext uri="{FF2B5EF4-FFF2-40B4-BE49-F238E27FC236}">
+                <a16:creationId xmlns:a16="http://schemas.microsoft.com/office/drawing/2014/main" id="{67162522-8636-2D44-B363-A331C4EBA22A}"/>
+              </a:ext>
+            </a:extLst>
+          </p:cNvPr>
+          <p:cNvSpPr txBox="1"/>
+          <p:nvPr/>
+        </p:nvSpPr>
+        <p:spPr>
+          <a:xfrm>
+            <a:off x="-66497" y="-118883"/>
+            <a:ext cx="589590" cy="461665"/>
+          </a:xfrm>
+          <a:prstGeom prst="rect">
+            <a:avLst/>
+          </a:prstGeom>
+          <a:noFill/>
+        </p:spPr>
+        <p:txBody>
+          <a:bodyPr wrap="square" rtlCol="0">
+            <a:spAutoFit/>
+          </a:bodyPr>
+          <a:lstStyle/>
+          <a:p>
+            <a:r>
+              <a:rPr lang="en-US" sz="2400" b="1" dirty="0"/>
+              <a:t>A</a:t>
+            </a:r>
+          </a:p>
+        </p:txBody>
+      </p:sp>
       <p:pic>
         <p:nvPicPr>
-          <p:cNvPr id="19" name="Picture 18">
+          <p:cNvPr id="5" name="Picture 4">
             <a:extLst>
               <a:ext uri="{FF2B5EF4-FFF2-40B4-BE49-F238E27FC236}">
-                <a16:creationId xmlns:a16="http://schemas.microsoft.com/office/drawing/2014/main" id="{FD50BCDF-E8AC-744E-9C56-49161AB2D419}"/>
+                <a16:creationId xmlns:a16="http://schemas.microsoft.com/office/drawing/2014/main" id="{486626B9-BB57-4F48-BDE5-AC4A5461954E}"/>
               </a:ext>
             </a:extLst>
           </p:cNvPr>
@@ -3576,54 +3611,19 @@
         </p:nvPicPr>
         <p:blipFill rotWithShape="1">
           <a:blip r:embed="rId4"/>
-          <a:srcRect b="16599"/>
+          <a:srcRect b="16311"/>
           <a:stretch/>
         </p:blipFill>
         <p:spPr>
           <a:xfrm>
-            <a:off x="0" y="0"/>
-            <a:ext cx="3657600" cy="3050498"/>
+            <a:off x="3601039" y="0"/>
+            <a:ext cx="3714161" cy="3108325"/>
           </a:xfrm>
           <a:prstGeom prst="rect">
             <a:avLst/>
           </a:prstGeom>
         </p:spPr>
       </p:pic>
-      <p:sp>
-        <p:nvSpPr>
-          <p:cNvPr id="20" name="TextBox 19">
-            <a:extLst>
-              <a:ext uri="{FF2B5EF4-FFF2-40B4-BE49-F238E27FC236}">
-                <a16:creationId xmlns:a16="http://schemas.microsoft.com/office/drawing/2014/main" id="{67162522-8636-2D44-B363-A331C4EBA22A}"/>
-              </a:ext>
-            </a:extLst>
-          </p:cNvPr>
-          <p:cNvSpPr txBox="1"/>
-          <p:nvPr/>
-        </p:nvSpPr>
-        <p:spPr>
-          <a:xfrm>
-            <a:off x="-66497" y="-118883"/>
-            <a:ext cx="589590" cy="461665"/>
-          </a:xfrm>
-          <a:prstGeom prst="rect">
-            <a:avLst/>
-          </a:prstGeom>
-          <a:noFill/>
-        </p:spPr>
-        <p:txBody>
-          <a:bodyPr wrap="square" rtlCol="0">
-            <a:spAutoFit/>
-          </a:bodyPr>
-          <a:lstStyle/>
-          <a:p>
-            <a:r>
-              <a:rPr lang="en-US" sz="2400" b="1" dirty="0"/>
-              <a:t>A</a:t>
-            </a:r>
-          </a:p>
-        </p:txBody>
-      </p:sp>
       <p:sp>
         <p:nvSpPr>
           <p:cNvPr id="21" name="TextBox 20">

</xml_diff>